<commit_message>
Fixed a spelling error in Milestone_3_-_Presentation.pptx.
</commit_message>
<xml_diff>
--- a/documents/Milestone_3_-_Presentation.pptx
+++ b/documents/Milestone_3_-_Presentation.pptx
@@ -9540,15 +9540,7 @@
             </a:r>
             <a:r>
               <a:rPr lang="de-CH" dirty="0"/>
-              <a:t> </a:t>
-            </a:r>
-            <a:r>
-              <a:rPr lang="de-CH" dirty="0" err="1"/>
-              <a:t>Architectur</a:t>
-            </a:r>
-            <a:r>
-              <a:rPr lang="de-CH" dirty="0"/>
-              <a:t> -&gt; GUI konstruieren. </a:t>
+              <a:t> Architektur -&gt; GUI konstruieren. </a:t>
             </a:r>
             <a:endParaRPr lang="en-GB" dirty="0"/>
           </a:p>

</xml_diff>